<commit_message>
Update architecture diagram (#6701)
- Drop/deprecate Kubernetes dashboard for its security risks
- Insert vertical network segregation line between seed and shoot
- Insert hint about SNI routing that we exclusively do
- Fix poor choice of uppercase letters
- Realign various missaligned lines/boxes/notes
</commit_message>
<xml_diff>
--- a/docs/concepts/images/gardener-architecture-detailed.pptx
+++ b/docs/concepts/images/gardener-architecture-detailed.pptx
@@ -107,6 +107,11 @@
       </a:defRPr>
     </a:lvl9pPr>
   </p:defaultTextStyle>
+  <p:extLst>
+    <p:ext uri="{EFAFB233-063F-42B5-8137-9DF3F51BA10A}">
+      <p15:sldGuideLst xmlns:p15="http://schemas.microsoft.com/office/powerpoint/2012/main"/>
+    </p:ext>
+  </p:extLst>
 </p:presentation>
 </file>
 
@@ -192,7 +197,7 @@
           <a:p>
             <a:fld id="{13E0A233-D006-1049-96B2-56CCC883D470}" type="datetimeFigureOut">
               <a:rPr lang="en-DE" smtClean="0"/>
-              <a:t>17.03.22</a:t>
+              <a:t>20.09.22</a:t>
             </a:fld>
             <a:endParaRPr lang="en-DE"/>
           </a:p>
@@ -693,7 +698,7 @@
           <a:p>
             <a:fld id="{34148265-B100-ED48-B1D9-7B0C2D8678E5}" type="datetimeFigureOut">
               <a:rPr lang="en-DE" smtClean="0"/>
-              <a:t>17.03.22</a:t>
+              <a:t>20.09.22</a:t>
             </a:fld>
             <a:endParaRPr lang="en-DE"/>
           </a:p>
@@ -893,7 +898,7 @@
           <a:p>
             <a:fld id="{34148265-B100-ED48-B1D9-7B0C2D8678E5}" type="datetimeFigureOut">
               <a:rPr lang="en-DE" smtClean="0"/>
-              <a:t>17.03.22</a:t>
+              <a:t>20.09.22</a:t>
             </a:fld>
             <a:endParaRPr lang="en-DE"/>
           </a:p>
@@ -1103,7 +1108,7 @@
           <a:p>
             <a:fld id="{34148265-B100-ED48-B1D9-7B0C2D8678E5}" type="datetimeFigureOut">
               <a:rPr lang="en-DE" smtClean="0"/>
-              <a:t>17.03.22</a:t>
+              <a:t>20.09.22</a:t>
             </a:fld>
             <a:endParaRPr lang="en-DE"/>
           </a:p>
@@ -1303,7 +1308,7 @@
           <a:p>
             <a:fld id="{34148265-B100-ED48-B1D9-7B0C2D8678E5}" type="datetimeFigureOut">
               <a:rPr lang="en-DE" smtClean="0"/>
-              <a:t>17.03.22</a:t>
+              <a:t>20.09.22</a:t>
             </a:fld>
             <a:endParaRPr lang="en-DE"/>
           </a:p>
@@ -1579,7 +1584,7 @@
           <a:p>
             <a:fld id="{34148265-B100-ED48-B1D9-7B0C2D8678E5}" type="datetimeFigureOut">
               <a:rPr lang="en-DE" smtClean="0"/>
-              <a:t>17.03.22</a:t>
+              <a:t>20.09.22</a:t>
             </a:fld>
             <a:endParaRPr lang="en-DE"/>
           </a:p>
@@ -1847,7 +1852,7 @@
           <a:p>
             <a:fld id="{34148265-B100-ED48-B1D9-7B0C2D8678E5}" type="datetimeFigureOut">
               <a:rPr lang="en-DE" smtClean="0"/>
-              <a:t>17.03.22</a:t>
+              <a:t>20.09.22</a:t>
             </a:fld>
             <a:endParaRPr lang="en-DE"/>
           </a:p>
@@ -2262,7 +2267,7 @@
           <a:p>
             <a:fld id="{34148265-B100-ED48-B1D9-7B0C2D8678E5}" type="datetimeFigureOut">
               <a:rPr lang="en-DE" smtClean="0"/>
-              <a:t>17.03.22</a:t>
+              <a:t>20.09.22</a:t>
             </a:fld>
             <a:endParaRPr lang="en-DE"/>
           </a:p>
@@ -2404,7 +2409,7 @@
           <a:p>
             <a:fld id="{34148265-B100-ED48-B1D9-7B0C2D8678E5}" type="datetimeFigureOut">
               <a:rPr lang="en-DE" smtClean="0"/>
-              <a:t>17.03.22</a:t>
+              <a:t>20.09.22</a:t>
             </a:fld>
             <a:endParaRPr lang="en-DE"/>
           </a:p>
@@ -2517,7 +2522,7 @@
           <a:p>
             <a:fld id="{34148265-B100-ED48-B1D9-7B0C2D8678E5}" type="datetimeFigureOut">
               <a:rPr lang="en-DE" smtClean="0"/>
-              <a:t>17.03.22</a:t>
+              <a:t>20.09.22</a:t>
             </a:fld>
             <a:endParaRPr lang="en-DE"/>
           </a:p>
@@ -2830,7 +2835,7 @@
           <a:p>
             <a:fld id="{34148265-B100-ED48-B1D9-7B0C2D8678E5}" type="datetimeFigureOut">
               <a:rPr lang="en-DE" smtClean="0"/>
-              <a:t>17.03.22</a:t>
+              <a:t>20.09.22</a:t>
             </a:fld>
             <a:endParaRPr lang="en-DE"/>
           </a:p>
@@ -3119,7 +3124,7 @@
           <a:p>
             <a:fld id="{34148265-B100-ED48-B1D9-7B0C2D8678E5}" type="datetimeFigureOut">
               <a:rPr lang="en-DE" smtClean="0"/>
-              <a:t>17.03.22</a:t>
+              <a:t>20.09.22</a:t>
             </a:fld>
             <a:endParaRPr lang="en-DE"/>
           </a:p>
@@ -3362,7 +3367,7 @@
           <a:p>
             <a:fld id="{34148265-B100-ED48-B1D9-7B0C2D8678E5}" type="datetimeFigureOut">
               <a:rPr lang="en-DE" smtClean="0"/>
-              <a:t>17.03.22</a:t>
+              <a:t>20.09.22</a:t>
             </a:fld>
             <a:endParaRPr lang="en-DE"/>
           </a:p>
@@ -3844,7 +3849,7 @@
         </p:nvSpPr>
         <p:spPr bwMode="auto">
           <a:xfrm>
-            <a:off x="4878461" y="1987555"/>
+            <a:off x="4610013" y="1987555"/>
             <a:ext cx="3252401" cy="4404644"/>
           </a:xfrm>
           <a:prstGeom prst="rect">
@@ -3899,7 +3904,7 @@
         </p:nvSpPr>
         <p:spPr bwMode="auto">
           <a:xfrm>
-            <a:off x="4964338" y="3202826"/>
+            <a:off x="4695890" y="3202826"/>
             <a:ext cx="3054438" cy="3041601"/>
           </a:xfrm>
           <a:prstGeom prst="rect">
@@ -3997,7 +4002,7 @@
         </p:nvSpPr>
         <p:spPr bwMode="auto">
           <a:xfrm>
-            <a:off x="848943" y="899517"/>
+            <a:off x="1000131" y="899517"/>
             <a:ext cx="858591" cy="396000"/>
           </a:xfrm>
           <a:prstGeom prst="rect">
@@ -4037,47 +4042,9 @@
           <p:nvPr/>
         </p:nvCxnSpPr>
         <p:spPr>
-          <a:xfrm flipV="1">
-            <a:off x="572739" y="1908492"/>
-            <a:ext cx="11324585" cy="41576"/>
-          </a:xfrm>
-          <a:prstGeom prst="line">
-            <a:avLst/>
-          </a:prstGeom>
-          <a:ln w="12700">
-            <a:solidFill>
-              <a:schemeClr val="tx1"/>
-            </a:solidFill>
-            <a:prstDash val="dash"/>
-          </a:ln>
-        </p:spPr>
-        <p:style>
-          <a:lnRef idx="1">
-            <a:schemeClr val="accent1"/>
-          </a:lnRef>
-          <a:fillRef idx="0">
-            <a:schemeClr val="accent1"/>
-          </a:fillRef>
-          <a:effectRef idx="0">
-            <a:schemeClr val="accent1"/>
-          </a:effectRef>
-          <a:fontRef idx="minor">
-            <a:schemeClr val="tx1"/>
-          </a:fontRef>
-        </p:style>
-      </p:cxnSp>
-      <p:cxnSp>
-        <p:nvCxnSpPr>
-          <p:cNvPr id="300" name="Straight Connector 299"/>
-          <p:cNvCxnSpPr>
-            <a:cxnSpLocks/>
-          </p:cNvCxnSpPr>
-          <p:nvPr/>
-        </p:nvCxnSpPr>
-        <p:spPr>
           <a:xfrm>
-            <a:off x="4555206" y="551204"/>
-            <a:ext cx="0" cy="6222378"/>
+            <a:off x="920318" y="1936122"/>
+            <a:ext cx="10648100" cy="0"/>
           </a:xfrm>
           <a:prstGeom prst="line">
             <a:avLst/>
@@ -4114,7 +4081,7 @@
         </p:nvSpPr>
         <p:spPr bwMode="auto">
           <a:xfrm>
-            <a:off x="4964866" y="6067831"/>
+            <a:off x="4696418" y="6067831"/>
             <a:ext cx="431800" cy="366712"/>
           </a:xfrm>
           <a:prstGeom prst="rect">
@@ -4160,7 +4127,7 @@
         </p:nvSpPr>
         <p:spPr>
           <a:xfrm>
-            <a:off x="5335043" y="4003946"/>
+            <a:off x="5066595" y="4003946"/>
             <a:ext cx="1628152" cy="2185744"/>
           </a:xfrm>
           <a:prstGeom prst="rect">
@@ -4206,7 +4173,7 @@
         </p:nvSpPr>
         <p:spPr bwMode="auto">
           <a:xfrm>
-            <a:off x="7048037" y="4078115"/>
+            <a:off x="6779589" y="4078115"/>
             <a:ext cx="720000" cy="162000"/>
           </a:xfrm>
           <a:prstGeom prst="roundRect">
@@ -4256,7 +4223,7 @@
         </p:nvCxnSpPr>
         <p:spPr>
           <a:xfrm>
-            <a:off x="7507041" y="4078115"/>
+            <a:off x="7238593" y="4078115"/>
             <a:ext cx="0" cy="162000"/>
           </a:xfrm>
           <a:prstGeom prst="line">
@@ -4737,7 +4704,7 @@
         </p:nvSpPr>
         <p:spPr>
           <a:xfrm>
-            <a:off x="572739" y="1757504"/>
+            <a:off x="891953" y="1757504"/>
             <a:ext cx="528024" cy="153888"/>
           </a:xfrm>
           <a:prstGeom prst="rect">
@@ -4781,7 +4748,7 @@
         </p:nvSpPr>
         <p:spPr bwMode="auto">
           <a:xfrm>
-            <a:off x="4962541" y="2208506"/>
+            <a:off x="4694093" y="2208506"/>
             <a:ext cx="1367747" cy="206532"/>
           </a:xfrm>
           <a:prstGeom prst="rect">
@@ -4824,7 +4791,7 @@
         </p:nvSpPr>
         <p:spPr bwMode="auto">
           <a:xfrm>
-            <a:off x="4851790" y="6202187"/>
+            <a:off x="4583342" y="6202187"/>
             <a:ext cx="431800" cy="366712"/>
           </a:xfrm>
           <a:prstGeom prst="rect">
@@ -5426,53 +5393,6 @@
       </p:sp>
       <p:sp>
         <p:nvSpPr>
-          <p:cNvPr id="221" name="Rectangle 138"/>
-          <p:cNvSpPr>
-            <a:spLocks noChangeArrowheads="1"/>
-          </p:cNvSpPr>
-          <p:nvPr/>
-        </p:nvSpPr>
-        <p:spPr bwMode="auto">
-          <a:xfrm>
-            <a:off x="1779564" y="900276"/>
-            <a:ext cx="786464" cy="396000"/>
-          </a:xfrm>
-          <a:prstGeom prst="rect">
-            <a:avLst/>
-          </a:prstGeom>
-          <a:solidFill>
-            <a:srgbClr val="DDDDDD"/>
-          </a:solidFill>
-          <a:ln w="17780">
-            <a:solidFill>
-              <a:schemeClr val="tx1"/>
-            </a:solidFill>
-            <a:miter lim="800000"/>
-            <a:headEnd/>
-            <a:tailEnd/>
-          </a:ln>
-        </p:spPr>
-        <p:txBody>
-          <a:bodyPr lIns="36000" tIns="36000" rIns="36000" bIns="36000" anchor="ctr"/>
-          <a:lstStyle/>
-          <a:p>
-            <a:pPr algn="ctr"/>
-            <a:r>
-              <a:rPr lang="en-US" sz="1200" dirty="0"/>
-              <a:t>Kubernetes</a:t>
-            </a:r>
-          </a:p>
-          <a:p>
-            <a:pPr algn="ctr"/>
-            <a:r>
-              <a:rPr lang="en-US" sz="1200" dirty="0"/>
-              <a:t>Dashboard</a:t>
-            </a:r>
-          </a:p>
-        </p:txBody>
-      </p:sp>
-      <p:sp>
-        <p:nvSpPr>
           <p:cNvPr id="222" name="Rectangle 138"/>
           <p:cNvSpPr>
             <a:spLocks noChangeArrowheads="1"/>
@@ -5481,7 +5401,7 @@
         </p:nvSpPr>
         <p:spPr bwMode="auto">
           <a:xfrm>
-            <a:off x="3465834" y="896752"/>
+            <a:off x="3297071" y="896752"/>
             <a:ext cx="780758" cy="396000"/>
           </a:xfrm>
           <a:prstGeom prst="rect">
@@ -5523,48 +5443,13 @@
       </p:sp>
       <p:cxnSp>
         <p:nvCxnSpPr>
-          <p:cNvPr id="230" name="Straight Connector 229"/>
-          <p:cNvCxnSpPr/>
-          <p:nvPr/>
-        </p:nvCxnSpPr>
-        <p:spPr>
-          <a:xfrm flipH="1">
-            <a:off x="2189751" y="713163"/>
-            <a:ext cx="875" cy="186354"/>
-          </a:xfrm>
-          <a:prstGeom prst="line">
-            <a:avLst/>
-          </a:prstGeom>
-          <a:ln w="12700">
-            <a:solidFill>
-              <a:schemeClr val="tx1"/>
-            </a:solidFill>
-          </a:ln>
-        </p:spPr>
-        <p:style>
-          <a:lnRef idx="1">
-            <a:schemeClr val="accent1"/>
-          </a:lnRef>
-          <a:fillRef idx="0">
-            <a:schemeClr val="accent1"/>
-          </a:fillRef>
-          <a:effectRef idx="0">
-            <a:schemeClr val="accent1"/>
-          </a:effectRef>
-          <a:fontRef idx="minor">
-            <a:schemeClr val="tx1"/>
-          </a:fontRef>
-        </p:style>
-      </p:cxnSp>
-      <p:cxnSp>
-        <p:nvCxnSpPr>
           <p:cNvPr id="236" name="Straight Connector 235"/>
           <p:cNvCxnSpPr/>
           <p:nvPr/>
         </p:nvCxnSpPr>
         <p:spPr>
           <a:xfrm flipH="1">
-            <a:off x="2996054" y="713163"/>
+            <a:off x="2559826" y="713163"/>
             <a:ext cx="875" cy="186354"/>
           </a:xfrm>
           <a:prstGeom prst="line">
@@ -5666,14 +5551,14 @@
           <a:p>
             <a:pPr algn="ctr"/>
             <a:r>
-              <a:rPr lang="en-US" sz="1200"/>
+              <a:rPr lang="en-US" sz="1200" dirty="0"/>
               <a:t>Kubernetes</a:t>
             </a:r>
           </a:p>
           <a:p>
             <a:pPr algn="ctr"/>
             <a:r>
-              <a:rPr lang="en-US" sz="1200"/>
+              <a:rPr lang="en-US" sz="1200" dirty="0"/>
               <a:t>Dashboard</a:t>
             </a:r>
           </a:p>
@@ -5759,7 +5644,7 @@
         </p:nvSpPr>
         <p:spPr bwMode="auto">
           <a:xfrm>
-            <a:off x="4962479" y="2610932"/>
+            <a:off x="4694031" y="2610932"/>
             <a:ext cx="1143753" cy="396000"/>
           </a:xfrm>
           <a:prstGeom prst="rect">
@@ -6137,7 +6022,7 @@
         </p:nvGrpSpPr>
         <p:grpSpPr bwMode="auto">
           <a:xfrm rot="5400000">
-            <a:off x="6118750" y="2687731"/>
+            <a:off x="5850302" y="2687731"/>
             <a:ext cx="224283" cy="251319"/>
             <a:chOff x="998" y="3624"/>
             <a:chExt cx="271" cy="271"/>
@@ -6324,7 +6209,7 @@
         </p:nvSpPr>
         <p:spPr bwMode="auto">
           <a:xfrm>
-            <a:off x="6356552" y="2610341"/>
+            <a:off x="6088104" y="2610341"/>
             <a:ext cx="1152626" cy="407892"/>
           </a:xfrm>
           <a:prstGeom prst="roundRect">
@@ -6416,46 +6301,8 @@
         </p:nvCxnSpPr>
         <p:spPr>
           <a:xfrm>
-            <a:off x="3856213" y="1292752"/>
+            <a:off x="3687450" y="1292752"/>
             <a:ext cx="0" cy="915051"/>
-          </a:xfrm>
-          <a:prstGeom prst="line">
-            <a:avLst/>
-          </a:prstGeom>
-          <a:ln w="12700">
-            <a:solidFill>
-              <a:schemeClr val="tx1"/>
-            </a:solidFill>
-          </a:ln>
-        </p:spPr>
-        <p:style>
-          <a:lnRef idx="1">
-            <a:schemeClr val="accent1"/>
-          </a:lnRef>
-          <a:fillRef idx="0">
-            <a:schemeClr val="accent1"/>
-          </a:fillRef>
-          <a:effectRef idx="0">
-            <a:schemeClr val="accent1"/>
-          </a:effectRef>
-          <a:fontRef idx="minor">
-            <a:schemeClr val="tx1"/>
-          </a:fontRef>
-        </p:style>
-      </p:cxnSp>
-      <p:cxnSp>
-        <p:nvCxnSpPr>
-          <p:cNvPr id="336" name="Straight Connector 335"/>
-          <p:cNvCxnSpPr>
-            <a:cxnSpLocks/>
-            <a:stCxn id="221" idx="2"/>
-          </p:cNvCxnSpPr>
-          <p:nvPr/>
-        </p:nvCxnSpPr>
-        <p:spPr>
-          <a:xfrm>
-            <a:off x="2172796" y="1296276"/>
-            <a:ext cx="0" cy="463108"/>
           </a:xfrm>
           <a:prstGeom prst="line">
             <a:avLst/>
@@ -6720,12 +6567,12 @@
         </p:nvCxnSpPr>
         <p:spPr>
           <a:xfrm rot="5400000">
-            <a:off x="7768354" y="776017"/>
-            <a:ext cx="923093" cy="1941885"/>
+            <a:off x="7634130" y="641793"/>
+            <a:ext cx="923093" cy="2210333"/>
           </a:xfrm>
           <a:prstGeom prst="bentConnector3">
             <a:avLst>
-              <a:gd name="adj1" fmla="val 39082"/>
+              <a:gd name="adj1" fmla="val 39095"/>
             </a:avLst>
           </a:prstGeom>
           <a:ln w="12700">
@@ -6757,7 +6604,7 @@
         </p:nvCxnSpPr>
         <p:spPr>
           <a:xfrm flipV="1">
-            <a:off x="5561594" y="2427237"/>
+            <a:off x="5293146" y="2427237"/>
             <a:ext cx="0" cy="188070"/>
           </a:xfrm>
           <a:prstGeom prst="line">
@@ -7994,7 +7841,7 @@
         </p:nvGrpSpPr>
         <p:grpSpPr>
           <a:xfrm>
-            <a:off x="10577292" y="694785"/>
+            <a:off x="10577292" y="703174"/>
             <a:ext cx="151694" cy="171451"/>
             <a:chOff x="4873292" y="193240"/>
             <a:chExt cx="151694" cy="171451"/>
@@ -8122,7 +7969,7 @@
         </p:nvGrpSpPr>
         <p:grpSpPr>
           <a:xfrm>
-            <a:off x="9093191" y="694785"/>
+            <a:off x="9093191" y="703174"/>
             <a:ext cx="151694" cy="171451"/>
             <a:chOff x="4873292" y="193240"/>
             <a:chExt cx="151694" cy="171451"/>
@@ -8250,7 +8097,7 @@
         </p:nvGrpSpPr>
         <p:grpSpPr>
           <a:xfrm>
-            <a:off x="1207224" y="704889"/>
+            <a:off x="1207224" y="703174"/>
             <a:ext cx="151694" cy="171451"/>
             <a:chOff x="4873292" y="193240"/>
             <a:chExt cx="151694" cy="171451"/>
@@ -8378,7 +8225,7 @@
         </p:nvGrpSpPr>
         <p:grpSpPr>
           <a:xfrm>
-            <a:off x="2880937" y="704889"/>
+            <a:off x="2444709" y="703174"/>
             <a:ext cx="151694" cy="171451"/>
             <a:chOff x="4873292" y="193240"/>
             <a:chExt cx="151694" cy="171451"/>
@@ -8500,141 +8347,13 @@
       </p:grpSp>
       <p:grpSp>
         <p:nvGrpSpPr>
-          <p:cNvPr id="359" name="Group 358"/>
-          <p:cNvGrpSpPr/>
-          <p:nvPr/>
-        </p:nvGrpSpPr>
-        <p:grpSpPr>
-          <a:xfrm>
-            <a:off x="2077675" y="704889"/>
-            <a:ext cx="151694" cy="171451"/>
-            <a:chOff x="4873292" y="193240"/>
-            <a:chExt cx="151694" cy="171451"/>
-          </a:xfrm>
-        </p:grpSpPr>
-        <p:sp>
-          <p:nvSpPr>
-            <p:cNvPr id="361" name="Line 104"/>
-            <p:cNvSpPr>
-              <a:spLocks noChangeShapeType="1"/>
-            </p:cNvSpPr>
-            <p:nvPr/>
-          </p:nvSpPr>
-          <p:spPr bwMode="auto">
-            <a:xfrm flipH="1">
-              <a:off x="4900280" y="329947"/>
-              <a:ext cx="0" cy="34744"/>
-            </a:xfrm>
-            <a:prstGeom prst="line">
-              <a:avLst/>
-            </a:prstGeom>
-            <a:noFill/>
-            <a:ln w="8890">
-              <a:solidFill>
-                <a:schemeClr val="tx1"/>
-              </a:solidFill>
-              <a:round/>
-              <a:headEnd/>
-              <a:tailEnd type="stealth" w="med" len="med"/>
-            </a:ln>
-          </p:spPr>
-          <p:txBody>
-            <a:bodyPr lIns="90000" tIns="46800" rIns="90000" bIns="46800" anchor="ctr"/>
-            <a:lstStyle/>
-            <a:p>
-              <a:endParaRPr lang="en-US"/>
-            </a:p>
-          </p:txBody>
-        </p:sp>
-        <p:sp>
-          <p:nvSpPr>
-            <p:cNvPr id="362" name="Text Box 105"/>
-            <p:cNvSpPr txBox="1">
-              <a:spLocks noChangeArrowheads="1"/>
-            </p:cNvSpPr>
-            <p:nvPr/>
-          </p:nvSpPr>
-          <p:spPr bwMode="auto">
-            <a:xfrm>
-              <a:off x="4873292" y="193240"/>
-              <a:ext cx="85725" cy="122238"/>
-            </a:xfrm>
-            <a:prstGeom prst="rect">
-              <a:avLst/>
-            </a:prstGeom>
-            <a:noFill/>
-            <a:ln w="12700">
-              <a:noFill/>
-              <a:miter lim="800000"/>
-              <a:headEnd/>
-              <a:tailEnd/>
-            </a:ln>
-          </p:spPr>
-          <p:txBody>
-            <a:bodyPr lIns="0" tIns="0" rIns="0" bIns="0">
-              <a:spAutoFit/>
-            </a:bodyPr>
-            <a:lstStyle/>
-            <a:p>
-              <a:pPr algn="l">
-                <a:buClrTx/>
-                <a:buSzTx/>
-                <a:buFontTx/>
-                <a:buNone/>
-              </a:pPr>
-              <a:r>
-                <a:rPr lang="en-US" sz="800" b="1"/>
-                <a:t>R</a:t>
-              </a:r>
-            </a:p>
-          </p:txBody>
-        </p:sp>
-        <p:sp>
-          <p:nvSpPr>
-            <p:cNvPr id="363" name="AutoShape 76"/>
-            <p:cNvSpPr>
-              <a:spLocks noChangeArrowheads="1"/>
-            </p:cNvSpPr>
-            <p:nvPr/>
-          </p:nvSpPr>
-          <p:spPr bwMode="auto">
-            <a:xfrm rot="5400000">
-              <a:off x="4952986" y="257947"/>
-              <a:ext cx="72000" cy="72000"/>
-            </a:xfrm>
-            <a:prstGeom prst="flowChartConnector">
-              <a:avLst/>
-            </a:prstGeom>
-            <a:solidFill>
-              <a:schemeClr val="bg1"/>
-            </a:solidFill>
-            <a:ln w="17780">
-              <a:solidFill>
-                <a:schemeClr val="tx1"/>
-              </a:solidFill>
-              <a:round/>
-              <a:headEnd/>
-              <a:tailEnd/>
-            </a:ln>
-          </p:spPr>
-          <p:txBody>
-            <a:bodyPr wrap="none" lIns="90000" tIns="46800" rIns="90000" bIns="46800" anchor="ctr"/>
-            <a:lstStyle/>
-            <a:p>
-              <a:endParaRPr lang="en-US"/>
-            </a:p>
-          </p:txBody>
-        </p:sp>
-      </p:grpSp>
-      <p:grpSp>
-        <p:nvGrpSpPr>
           <p:cNvPr id="364" name="Group 363"/>
           <p:cNvGrpSpPr/>
           <p:nvPr/>
         </p:nvGrpSpPr>
         <p:grpSpPr>
           <a:xfrm>
-            <a:off x="1371146" y="1307647"/>
+            <a:off x="1371146" y="1283862"/>
             <a:ext cx="151694" cy="171451"/>
             <a:chOff x="4873292" y="193240"/>
             <a:chExt cx="151694" cy="171451"/>
@@ -8882,134 +8601,6 @@
           </p:txBody>
         </p:sp>
       </p:grpSp>
-      <p:grpSp>
-        <p:nvGrpSpPr>
-          <p:cNvPr id="374" name="Group 373"/>
-          <p:cNvGrpSpPr/>
-          <p:nvPr/>
-        </p:nvGrpSpPr>
-        <p:grpSpPr>
-          <a:xfrm>
-            <a:off x="2057287" y="1307647"/>
-            <a:ext cx="151694" cy="171451"/>
-            <a:chOff x="4873292" y="193240"/>
-            <a:chExt cx="151694" cy="171451"/>
-          </a:xfrm>
-        </p:grpSpPr>
-        <p:sp>
-          <p:nvSpPr>
-            <p:cNvPr id="375" name="Line 104"/>
-            <p:cNvSpPr>
-              <a:spLocks noChangeShapeType="1"/>
-            </p:cNvSpPr>
-            <p:nvPr/>
-          </p:nvSpPr>
-          <p:spPr bwMode="auto">
-            <a:xfrm flipH="1">
-              <a:off x="4900280" y="329947"/>
-              <a:ext cx="0" cy="34744"/>
-            </a:xfrm>
-            <a:prstGeom prst="line">
-              <a:avLst/>
-            </a:prstGeom>
-            <a:noFill/>
-            <a:ln w="8890">
-              <a:solidFill>
-                <a:schemeClr val="tx1"/>
-              </a:solidFill>
-              <a:round/>
-              <a:headEnd/>
-              <a:tailEnd type="stealth" w="med" len="med"/>
-            </a:ln>
-          </p:spPr>
-          <p:txBody>
-            <a:bodyPr lIns="90000" tIns="46800" rIns="90000" bIns="46800" anchor="ctr"/>
-            <a:lstStyle/>
-            <a:p>
-              <a:endParaRPr lang="en-US"/>
-            </a:p>
-          </p:txBody>
-        </p:sp>
-        <p:sp>
-          <p:nvSpPr>
-            <p:cNvPr id="376" name="Text Box 105"/>
-            <p:cNvSpPr txBox="1">
-              <a:spLocks noChangeArrowheads="1"/>
-            </p:cNvSpPr>
-            <p:nvPr/>
-          </p:nvSpPr>
-          <p:spPr bwMode="auto">
-            <a:xfrm>
-              <a:off x="4873292" y="193240"/>
-              <a:ext cx="85725" cy="122238"/>
-            </a:xfrm>
-            <a:prstGeom prst="rect">
-              <a:avLst/>
-            </a:prstGeom>
-            <a:noFill/>
-            <a:ln w="12700">
-              <a:noFill/>
-              <a:miter lim="800000"/>
-              <a:headEnd/>
-              <a:tailEnd/>
-            </a:ln>
-          </p:spPr>
-          <p:txBody>
-            <a:bodyPr lIns="0" tIns="0" rIns="0" bIns="0">
-              <a:spAutoFit/>
-            </a:bodyPr>
-            <a:lstStyle/>
-            <a:p>
-              <a:pPr algn="l">
-                <a:buClrTx/>
-                <a:buSzTx/>
-                <a:buFontTx/>
-                <a:buNone/>
-              </a:pPr>
-              <a:r>
-                <a:rPr lang="en-US" sz="800" b="1"/>
-                <a:t>R</a:t>
-              </a:r>
-            </a:p>
-          </p:txBody>
-        </p:sp>
-        <p:sp>
-          <p:nvSpPr>
-            <p:cNvPr id="378" name="AutoShape 76"/>
-            <p:cNvSpPr>
-              <a:spLocks noChangeArrowheads="1"/>
-            </p:cNvSpPr>
-            <p:nvPr/>
-          </p:nvSpPr>
-          <p:spPr bwMode="auto">
-            <a:xfrm rot="5400000">
-              <a:off x="4952986" y="257947"/>
-              <a:ext cx="72000" cy="72000"/>
-            </a:xfrm>
-            <a:prstGeom prst="flowChartConnector">
-              <a:avLst/>
-            </a:prstGeom>
-            <a:solidFill>
-              <a:schemeClr val="bg1"/>
-            </a:solidFill>
-            <a:ln w="17780">
-              <a:solidFill>
-                <a:schemeClr val="tx1"/>
-              </a:solidFill>
-              <a:round/>
-              <a:headEnd/>
-              <a:tailEnd/>
-            </a:ln>
-          </p:spPr>
-          <p:txBody>
-            <a:bodyPr wrap="none" lIns="90000" tIns="46800" rIns="90000" bIns="46800" anchor="ctr"/>
-            <a:lstStyle/>
-            <a:p>
-              <a:endParaRPr lang="en-US"/>
-            </a:p>
-          </p:txBody>
-        </p:sp>
-      </p:grpSp>
       <p:cxnSp>
         <p:nvCxnSpPr>
           <p:cNvPr id="384" name="Straight Connector 383"/>
@@ -9020,7 +8611,7 @@
         </p:nvCxnSpPr>
         <p:spPr>
           <a:xfrm flipV="1">
-            <a:off x="5561594" y="3002516"/>
+            <a:off x="5293146" y="3002516"/>
             <a:ext cx="0" cy="454939"/>
           </a:xfrm>
           <a:prstGeom prst="line">
@@ -9220,7 +8811,7 @@
         </p:nvGrpSpPr>
         <p:grpSpPr>
           <a:xfrm>
-            <a:off x="9088878" y="1323882"/>
+            <a:off x="9088878" y="1283862"/>
             <a:ext cx="151694" cy="171451"/>
             <a:chOff x="4873292" y="193240"/>
             <a:chExt cx="151694" cy="171451"/>
@@ -9732,7 +9323,7 @@
         </p:nvGrpSpPr>
         <p:grpSpPr>
           <a:xfrm>
-            <a:off x="5445403" y="3030650"/>
+            <a:off x="5176955" y="3030650"/>
             <a:ext cx="151694" cy="171029"/>
             <a:chOff x="4873292" y="581648"/>
             <a:chExt cx="151694" cy="171029"/>
@@ -9860,7 +9451,7 @@
         </p:nvGrpSpPr>
         <p:grpSpPr>
           <a:xfrm>
-            <a:off x="5444707" y="2410925"/>
+            <a:off x="5176259" y="2410925"/>
             <a:ext cx="151694" cy="171451"/>
             <a:chOff x="4873292" y="193240"/>
             <a:chExt cx="151694" cy="171451"/>
@@ -10030,21 +9621,21 @@
                 <a:ea typeface="Arial Unicode MS" pitchFamily="34" charset="-128"/>
                 <a:cs typeface="Arial Unicode MS" pitchFamily="34" charset="-128"/>
               </a:rPr>
-              <a:t>New </a:t>
+              <a:t>New shoot </a:t>
             </a:r>
             <a:r>
               <a:rPr lang="de-DE" sz="800" b="1" kern="0" dirty="0" err="1">
                 <a:ea typeface="Arial Unicode MS" pitchFamily="34" charset="-128"/>
                 <a:cs typeface="Arial Unicode MS" pitchFamily="34" charset="-128"/>
               </a:rPr>
-              <a:t>Shoot</a:t>
+              <a:t>clusters</a:t>
             </a:r>
             <a:r>
               <a:rPr lang="de-DE" sz="800" b="1" kern="0" dirty="0">
                 <a:ea typeface="Arial Unicode MS" pitchFamily="34" charset="-128"/>
                 <a:cs typeface="Arial Unicode MS" pitchFamily="34" charset="-128"/>
               </a:rPr>
-              <a:t> Clusters </a:t>
+              <a:t> </a:t>
             </a:r>
             <a:r>
               <a:rPr lang="de-DE" sz="800" b="1" kern="0" dirty="0" err="1">
@@ -10170,14 +9761,14 @@
                 <a:ea typeface="Arial Unicode MS" pitchFamily="34" charset="-128"/>
                 <a:cs typeface="Arial Unicode MS" pitchFamily="34" charset="-128"/>
               </a:rPr>
-              <a:t> </a:t>
+              <a:t> shoot </a:t>
             </a:r>
             <a:r>
               <a:rPr lang="de-DE" sz="800" b="1" kern="0" dirty="0" err="1">
                 <a:ea typeface="Arial Unicode MS" pitchFamily="34" charset="-128"/>
                 <a:cs typeface="Arial Unicode MS" pitchFamily="34" charset="-128"/>
               </a:rPr>
-              <a:t>Shoot</a:t>
+              <a:t>resource</a:t>
             </a:r>
             <a:r>
               <a:rPr lang="de-DE" sz="800" b="1" kern="0" dirty="0">
@@ -10191,7 +9782,7 @@
                 <a:ea typeface="Arial Unicode MS" pitchFamily="34" charset="-128"/>
                 <a:cs typeface="Arial Unicode MS" pitchFamily="34" charset="-128"/>
               </a:rPr>
-              <a:t>resource</a:t>
+              <a:t>to</a:t>
             </a:r>
             <a:r>
               <a:rPr lang="de-DE" sz="800" b="1" kern="0" dirty="0">
@@ -10205,7 +9796,7 @@
                 <a:ea typeface="Arial Unicode MS" pitchFamily="34" charset="-128"/>
                 <a:cs typeface="Arial Unicode MS" pitchFamily="34" charset="-128"/>
               </a:rPr>
-              <a:t>to</a:t>
+              <a:t>the</a:t>
             </a:r>
             <a:r>
               <a:rPr lang="de-DE" sz="800" b="1" kern="0" dirty="0">
@@ -10219,14 +9810,42 @@
                 <a:ea typeface="Arial Unicode MS" pitchFamily="34" charset="-128"/>
                 <a:cs typeface="Arial Unicode MS" pitchFamily="34" charset="-128"/>
               </a:rPr>
-              <a:t>the</a:t>
+              <a:t>garden</a:t>
             </a:r>
             <a:r>
               <a:rPr lang="de-DE" sz="800" b="1" kern="0" dirty="0">
                 <a:ea typeface="Arial Unicode MS" pitchFamily="34" charset="-128"/>
                 <a:cs typeface="Arial Unicode MS" pitchFamily="34" charset="-128"/>
               </a:rPr>
-              <a:t> Garden Cluster. The Gardener Scheduler </a:t>
+              <a:t> </a:t>
+            </a:r>
+            <a:r>
+              <a:rPr lang="de-DE" sz="800" b="1" kern="0" dirty="0" err="1">
+                <a:ea typeface="Arial Unicode MS" pitchFamily="34" charset="-128"/>
+                <a:cs typeface="Arial Unicode MS" pitchFamily="34" charset="-128"/>
+              </a:rPr>
+              <a:t>cluster</a:t>
+            </a:r>
+            <a:r>
+              <a:rPr lang="de-DE" sz="800" b="1" kern="0" dirty="0">
+                <a:ea typeface="Arial Unicode MS" pitchFamily="34" charset="-128"/>
+                <a:cs typeface="Arial Unicode MS" pitchFamily="34" charset="-128"/>
+              </a:rPr>
+              <a:t>. The Gardener </a:t>
+            </a:r>
+            <a:r>
+              <a:rPr lang="de-DE" sz="800" b="1" kern="0" dirty="0" err="1">
+                <a:ea typeface="Arial Unicode MS" pitchFamily="34" charset="-128"/>
+                <a:cs typeface="Arial Unicode MS" pitchFamily="34" charset="-128"/>
+              </a:rPr>
+              <a:t>scheduler</a:t>
+            </a:r>
+            <a:r>
+              <a:rPr lang="de-DE" sz="800" b="1" kern="0" dirty="0">
+                <a:ea typeface="Arial Unicode MS" pitchFamily="34" charset="-128"/>
+                <a:cs typeface="Arial Unicode MS" pitchFamily="34" charset="-128"/>
+              </a:rPr>
+              <a:t> </a:t>
             </a:r>
             <a:r>
               <a:rPr lang="de-DE" sz="800" b="1" kern="0" dirty="0" err="1">
@@ -10324,14 +9943,14 @@
                 <a:ea typeface="Arial Unicode MS" pitchFamily="34" charset="-128"/>
                 <a:cs typeface="Arial Unicode MS" pitchFamily="34" charset="-128"/>
               </a:rPr>
-              <a:t> </a:t>
+              <a:t> shoot </a:t>
             </a:r>
             <a:r>
               <a:rPr lang="de-DE" sz="800" b="1" kern="0" dirty="0" err="1">
                 <a:ea typeface="Arial Unicode MS" pitchFamily="34" charset="-128"/>
                 <a:cs typeface="Arial Unicode MS" pitchFamily="34" charset="-128"/>
               </a:rPr>
-              <a:t>shoot</a:t>
+              <a:t>cluster</a:t>
             </a:r>
             <a:r>
               <a:rPr lang="de-DE" sz="800" b="1" kern="0" dirty="0">
@@ -10562,14 +10181,28 @@
                 <a:ea typeface="Arial Unicode MS" pitchFamily="34" charset="-128"/>
                 <a:cs typeface="Arial Unicode MS" pitchFamily="34" charset="-128"/>
               </a:rPr>
-              <a:t> </a:t>
+              <a:t> IaaS </a:t>
             </a:r>
             <a:r>
               <a:rPr lang="de-DE" sz="800" b="1" kern="0" dirty="0" err="1">
                 <a:ea typeface="Arial Unicode MS" pitchFamily="34" charset="-128"/>
                 <a:cs typeface="Arial Unicode MS" pitchFamily="34" charset="-128"/>
               </a:rPr>
-              <a:t>IaaS</a:t>
+              <a:t>resources</a:t>
+            </a:r>
+            <a:r>
+              <a:rPr lang="de-DE" sz="800" b="1" kern="0" dirty="0">
+                <a:ea typeface="Arial Unicode MS" pitchFamily="34" charset="-128"/>
+                <a:cs typeface="Arial Unicode MS" pitchFamily="34" charset="-128"/>
+              </a:rPr>
+              <a:t>. </a:t>
+            </a:r>
+            <a:r>
+              <a:rPr lang="de-DE" sz="800" b="1" kern="0" dirty="0" err="1">
+                <a:ea typeface="Arial Unicode MS" pitchFamily="34" charset="-128"/>
+                <a:cs typeface="Arial Unicode MS" pitchFamily="34" charset="-128"/>
+              </a:rPr>
+              <a:t>It</a:t>
             </a:r>
             <a:r>
               <a:rPr lang="de-DE" sz="800" b="1" kern="0" dirty="0">
@@ -10583,21 +10216,7 @@
                 <a:ea typeface="Arial Unicode MS" pitchFamily="34" charset="-128"/>
                 <a:cs typeface="Arial Unicode MS" pitchFamily="34" charset="-128"/>
               </a:rPr>
-              <a:t>components</a:t>
-            </a:r>
-            <a:r>
-              <a:rPr lang="de-DE" sz="800" b="1" kern="0" dirty="0">
-                <a:ea typeface="Arial Unicode MS" pitchFamily="34" charset="-128"/>
-                <a:cs typeface="Arial Unicode MS" pitchFamily="34" charset="-128"/>
-              </a:rPr>
-              <a:t>. </a:t>
-            </a:r>
-            <a:r>
-              <a:rPr lang="de-DE" sz="800" b="1" kern="0" dirty="0" err="1">
-                <a:ea typeface="Arial Unicode MS" pitchFamily="34" charset="-128"/>
-                <a:cs typeface="Arial Unicode MS" pitchFamily="34" charset="-128"/>
-              </a:rPr>
-              <a:t>It</a:t>
+              <a:t>then</a:t>
             </a:r>
             <a:r>
               <a:rPr lang="de-DE" sz="800" b="1" kern="0" dirty="0">
@@ -10611,7 +10230,7 @@
                 <a:ea typeface="Arial Unicode MS" pitchFamily="34" charset="-128"/>
                 <a:cs typeface="Arial Unicode MS" pitchFamily="34" charset="-128"/>
               </a:rPr>
-              <a:t>then</a:t>
+              <a:t>deploys</a:t>
             </a:r>
             <a:r>
               <a:rPr lang="de-DE" sz="800" b="1" kern="0" dirty="0">
@@ -10625,7 +10244,21 @@
                 <a:ea typeface="Arial Unicode MS" pitchFamily="34" charset="-128"/>
                 <a:cs typeface="Arial Unicode MS" pitchFamily="34" charset="-128"/>
               </a:rPr>
-              <a:t>deploys</a:t>
+              <a:t>the</a:t>
+            </a:r>
+            <a:r>
+              <a:rPr lang="de-DE" sz="800" b="1" kern="0" dirty="0">
+                <a:ea typeface="Arial Unicode MS" pitchFamily="34" charset="-128"/>
+                <a:cs typeface="Arial Unicode MS" pitchFamily="34" charset="-128"/>
+              </a:rPr>
+              <a:t> shoot </a:t>
+            </a:r>
+            <a:r>
+              <a:rPr lang="de-DE" sz="800" b="1" kern="0" dirty="0" err="1">
+                <a:ea typeface="Arial Unicode MS" pitchFamily="34" charset="-128"/>
+                <a:cs typeface="Arial Unicode MS" pitchFamily="34" charset="-128"/>
+              </a:rPr>
+              <a:t>cluster</a:t>
             </a:r>
             <a:r>
               <a:rPr lang="de-DE" sz="800" b="1" kern="0" dirty="0">
@@ -10639,7 +10272,21 @@
                 <a:ea typeface="Arial Unicode MS" pitchFamily="34" charset="-128"/>
                 <a:cs typeface="Arial Unicode MS" pitchFamily="34" charset="-128"/>
               </a:rPr>
-              <a:t>the</a:t>
+              <a:t>control</a:t>
+            </a:r>
+            <a:r>
+              <a:rPr lang="de-DE" sz="800" b="1" kern="0" dirty="0">
+                <a:ea typeface="Arial Unicode MS" pitchFamily="34" charset="-128"/>
+                <a:cs typeface="Arial Unicode MS" pitchFamily="34" charset="-128"/>
+              </a:rPr>
+              <a:t> plane </a:t>
+            </a:r>
+            <a:r>
+              <a:rPr lang="de-DE" sz="800" b="1" kern="0" dirty="0" err="1">
+                <a:ea typeface="Arial Unicode MS" pitchFamily="34" charset="-128"/>
+                <a:cs typeface="Arial Unicode MS" pitchFamily="34" charset="-128"/>
+              </a:rPr>
+              <a:t>as</a:t>
             </a:r>
             <a:r>
               <a:rPr lang="de-DE" sz="800" b="1" kern="0" dirty="0">
@@ -10653,21 +10300,21 @@
                 <a:ea typeface="Arial Unicode MS" pitchFamily="34" charset="-128"/>
                 <a:cs typeface="Arial Unicode MS" pitchFamily="34" charset="-128"/>
               </a:rPr>
-              <a:t>Shoot</a:t>
+              <a:t>pods</a:t>
             </a:r>
             <a:r>
               <a:rPr lang="de-DE" sz="800" b="1" kern="0" dirty="0">
                 <a:ea typeface="Arial Unicode MS" pitchFamily="34" charset="-128"/>
                 <a:cs typeface="Arial Unicode MS" pitchFamily="34" charset="-128"/>
               </a:rPr>
-              <a:t> Cluster Control Plane </a:t>
+              <a:t> and </a:t>
             </a:r>
             <a:r>
               <a:rPr lang="de-DE" sz="800" b="1" kern="0" dirty="0" err="1">
                 <a:ea typeface="Arial Unicode MS" pitchFamily="34" charset="-128"/>
                 <a:cs typeface="Arial Unicode MS" pitchFamily="34" charset="-128"/>
               </a:rPr>
-              <a:t>as</a:t>
+              <a:t>the</a:t>
             </a:r>
             <a:r>
               <a:rPr lang="de-DE" sz="800" b="1" kern="0" dirty="0">
@@ -10681,7 +10328,7 @@
                 <a:ea typeface="Arial Unicode MS" pitchFamily="34" charset="-128"/>
                 <a:cs typeface="Arial Unicode MS" pitchFamily="34" charset="-128"/>
               </a:rPr>
-              <a:t>pods</a:t>
+              <a:t>required</a:t>
             </a:r>
             <a:r>
               <a:rPr lang="de-DE" sz="800" b="1" kern="0" dirty="0">
@@ -10695,7 +10342,7 @@
                 <a:ea typeface="Arial Unicode MS" pitchFamily="34" charset="-128"/>
                 <a:cs typeface="Arial Unicode MS" pitchFamily="34" charset="-128"/>
               </a:rPr>
-              <a:t>and</a:t>
+              <a:t>add-ons</a:t>
             </a:r>
             <a:r>
               <a:rPr lang="de-DE" sz="800" b="1" kern="0" dirty="0">
@@ -10709,7 +10356,7 @@
                 <a:ea typeface="Arial Unicode MS" pitchFamily="34" charset="-128"/>
                 <a:cs typeface="Arial Unicode MS" pitchFamily="34" charset="-128"/>
               </a:rPr>
-              <a:t>the</a:t>
+              <a:t>into</a:t>
             </a:r>
             <a:r>
               <a:rPr lang="de-DE" sz="800" b="1" kern="0" dirty="0">
@@ -10723,7 +10370,21 @@
                 <a:ea typeface="Arial Unicode MS" pitchFamily="34" charset="-128"/>
                 <a:cs typeface="Arial Unicode MS" pitchFamily="34" charset="-128"/>
               </a:rPr>
-              <a:t>required</a:t>
+              <a:t>the</a:t>
+            </a:r>
+            <a:r>
+              <a:rPr lang="de-DE" sz="800" b="1" kern="0" dirty="0">
+                <a:ea typeface="Arial Unicode MS" pitchFamily="34" charset="-128"/>
+                <a:cs typeface="Arial Unicode MS" pitchFamily="34" charset="-128"/>
+              </a:rPr>
+              <a:t> shoot </a:t>
+            </a:r>
+            <a:r>
+              <a:rPr lang="de-DE" sz="800" b="1" kern="0" dirty="0" err="1">
+                <a:ea typeface="Arial Unicode MS" pitchFamily="34" charset="-128"/>
+                <a:cs typeface="Arial Unicode MS" pitchFamily="34" charset="-128"/>
+              </a:rPr>
+              <a:t>cluster</a:t>
             </a:r>
             <a:r>
               <a:rPr lang="de-DE" sz="800" b="1" kern="0" dirty="0">
@@ -10737,7 +10398,21 @@
                 <a:ea typeface="Arial Unicode MS" pitchFamily="34" charset="-128"/>
                 <a:cs typeface="Arial Unicode MS" pitchFamily="34" charset="-128"/>
               </a:rPr>
-              <a:t>add-ons</a:t>
+              <a:t>itself</a:t>
+            </a:r>
+            <a:r>
+              <a:rPr lang="de-DE" sz="800" b="1" kern="0" dirty="0">
+                <a:ea typeface="Arial Unicode MS" pitchFamily="34" charset="-128"/>
+                <a:cs typeface="Arial Unicode MS" pitchFamily="34" charset="-128"/>
+              </a:rPr>
+              <a:t>. Update and </a:t>
+            </a:r>
+            <a:r>
+              <a:rPr lang="de-DE" sz="800" b="1" kern="0" dirty="0" err="1">
+                <a:ea typeface="Arial Unicode MS" pitchFamily="34" charset="-128"/>
+                <a:cs typeface="Arial Unicode MS" pitchFamily="34" charset="-128"/>
+              </a:rPr>
+              <a:t>delete</a:t>
             </a:r>
             <a:r>
               <a:rPr lang="de-DE" sz="800" b="1" kern="0" dirty="0">
@@ -10751,7 +10426,7 @@
                 <a:ea typeface="Arial Unicode MS" pitchFamily="34" charset="-128"/>
                 <a:cs typeface="Arial Unicode MS" pitchFamily="34" charset="-128"/>
               </a:rPr>
-              <a:t>into</a:t>
+              <a:t>operations</a:t>
             </a:r>
             <a:r>
               <a:rPr lang="de-DE" sz="800" b="1" kern="0" dirty="0">
@@ -10765,7 +10440,7 @@
                 <a:ea typeface="Arial Unicode MS" pitchFamily="34" charset="-128"/>
                 <a:cs typeface="Arial Unicode MS" pitchFamily="34" charset="-128"/>
               </a:rPr>
-              <a:t>the</a:t>
+              <a:t>are</a:t>
             </a:r>
             <a:r>
               <a:rPr lang="de-DE" sz="800" b="1" kern="0" dirty="0">
@@ -10779,35 +10454,7 @@
                 <a:ea typeface="Arial Unicode MS" pitchFamily="34" charset="-128"/>
                 <a:cs typeface="Arial Unicode MS" pitchFamily="34" charset="-128"/>
               </a:rPr>
-              <a:t>Shoot</a:t>
-            </a:r>
-            <a:r>
-              <a:rPr lang="de-DE" sz="800" b="1" kern="0" dirty="0">
-                <a:ea typeface="Arial Unicode MS" pitchFamily="34" charset="-128"/>
-                <a:cs typeface="Arial Unicode MS" pitchFamily="34" charset="-128"/>
-              </a:rPr>
-              <a:t> Cluster </a:t>
-            </a:r>
-            <a:r>
-              <a:rPr lang="de-DE" sz="800" b="1" kern="0" dirty="0" err="1">
-                <a:ea typeface="Arial Unicode MS" pitchFamily="34" charset="-128"/>
-                <a:cs typeface="Arial Unicode MS" pitchFamily="34" charset="-128"/>
-              </a:rPr>
-              <a:t>itself</a:t>
-            </a:r>
-            <a:r>
-              <a:rPr lang="de-DE" sz="800" b="1" kern="0" dirty="0">
-                <a:ea typeface="Arial Unicode MS" pitchFamily="34" charset="-128"/>
-                <a:cs typeface="Arial Unicode MS" pitchFamily="34" charset="-128"/>
-              </a:rPr>
-              <a:t>. Update </a:t>
-            </a:r>
-            <a:r>
-              <a:rPr lang="de-DE" sz="800" b="1" kern="0" dirty="0" err="1">
-                <a:ea typeface="Arial Unicode MS" pitchFamily="34" charset="-128"/>
-                <a:cs typeface="Arial Unicode MS" pitchFamily="34" charset="-128"/>
-              </a:rPr>
-              <a:t>or</a:t>
+              <a:t>handled</a:t>
             </a:r>
             <a:r>
               <a:rPr lang="de-DE" sz="800" b="1" kern="0" dirty="0">
@@ -10821,7 +10468,7 @@
                 <a:ea typeface="Arial Unicode MS" pitchFamily="34" charset="-128"/>
                 <a:cs typeface="Arial Unicode MS" pitchFamily="34" charset="-128"/>
               </a:rPr>
-              <a:t>delete</a:t>
+              <a:t>by</a:t>
             </a:r>
             <a:r>
               <a:rPr lang="de-DE" sz="800" b="1" kern="0" dirty="0">
@@ -10835,84 +10482,14 @@
                 <a:ea typeface="Arial Unicode MS" pitchFamily="34" charset="-128"/>
                 <a:cs typeface="Arial Unicode MS" pitchFamily="34" charset="-128"/>
               </a:rPr>
-              <a:t>operations</a:t>
+              <a:t>the</a:t>
             </a:r>
             <a:r>
               <a:rPr lang="de-DE" sz="800" b="1" kern="0" dirty="0">
                 <a:ea typeface="Arial Unicode MS" pitchFamily="34" charset="-128"/>
                 <a:cs typeface="Arial Unicode MS" pitchFamily="34" charset="-128"/>
               </a:rPr>
-              <a:t> </a:t>
-            </a:r>
-            <a:r>
-              <a:rPr lang="de-DE" sz="800" b="1" kern="0" dirty="0" err="1">
-                <a:ea typeface="Arial Unicode MS" pitchFamily="34" charset="-128"/>
-                <a:cs typeface="Arial Unicode MS" pitchFamily="34" charset="-128"/>
-              </a:rPr>
-              <a:t>are</a:t>
-            </a:r>
-            <a:r>
-              <a:rPr lang="de-DE" sz="800" b="1" kern="0" dirty="0">
-                <a:ea typeface="Arial Unicode MS" pitchFamily="34" charset="-128"/>
-                <a:cs typeface="Arial Unicode MS" pitchFamily="34" charset="-128"/>
-              </a:rPr>
-              <a:t> </a:t>
-            </a:r>
-            <a:r>
-              <a:rPr lang="de-DE" sz="800" b="1" kern="0" dirty="0" err="1">
-                <a:ea typeface="Arial Unicode MS" pitchFamily="34" charset="-128"/>
-                <a:cs typeface="Arial Unicode MS" pitchFamily="34" charset="-128"/>
-              </a:rPr>
-              <a:t>handled</a:t>
-            </a:r>
-            <a:r>
-              <a:rPr lang="de-DE" sz="800" b="1" kern="0" dirty="0">
-                <a:ea typeface="Arial Unicode MS" pitchFamily="34" charset="-128"/>
-                <a:cs typeface="Arial Unicode MS" pitchFamily="34" charset="-128"/>
-              </a:rPr>
-              <a:t> </a:t>
-            </a:r>
-            <a:r>
-              <a:rPr lang="de-DE" sz="800" b="1" kern="0" dirty="0" err="1">
-                <a:ea typeface="Arial Unicode MS" pitchFamily="34" charset="-128"/>
-                <a:cs typeface="Arial Unicode MS" pitchFamily="34" charset="-128"/>
-              </a:rPr>
-              <a:t>by</a:t>
-            </a:r>
-            <a:r>
-              <a:rPr lang="de-DE" sz="800" b="1" kern="0" dirty="0">
-                <a:ea typeface="Arial Unicode MS" pitchFamily="34" charset="-128"/>
-                <a:cs typeface="Arial Unicode MS" pitchFamily="34" charset="-128"/>
-              </a:rPr>
-              <a:t> </a:t>
-            </a:r>
-            <a:r>
-              <a:rPr lang="de-DE" sz="800" b="1" kern="0" dirty="0" err="1">
-                <a:ea typeface="Arial Unicode MS" pitchFamily="34" charset="-128"/>
-                <a:cs typeface="Arial Unicode MS" pitchFamily="34" charset="-128"/>
-              </a:rPr>
-              <a:t>the</a:t>
-            </a:r>
-            <a:r>
-              <a:rPr lang="de-DE" sz="800" b="1" kern="0" dirty="0">
-                <a:ea typeface="Arial Unicode MS" pitchFamily="34" charset="-128"/>
-                <a:cs typeface="Arial Unicode MS" pitchFamily="34" charset="-128"/>
-              </a:rPr>
-              <a:t> Gardenlet </a:t>
-            </a:r>
-            <a:r>
-              <a:rPr lang="de-DE" sz="800" b="1" kern="0" dirty="0" err="1">
-                <a:ea typeface="Arial Unicode MS" pitchFamily="34" charset="-128"/>
-                <a:cs typeface="Arial Unicode MS" pitchFamily="34" charset="-128"/>
-              </a:rPr>
-              <a:t>fully</a:t>
-            </a:r>
-            <a:r>
-              <a:rPr lang="de-DE" sz="800" b="1" kern="0" dirty="0">
-                <a:ea typeface="Arial Unicode MS" pitchFamily="34" charset="-128"/>
-                <a:cs typeface="Arial Unicode MS" pitchFamily="34" charset="-128"/>
-              </a:rPr>
-              <a:t> </a:t>
+              <a:t> Gardenlet fully </a:t>
             </a:r>
             <a:r>
               <a:rPr lang="de-DE" sz="800" b="1" kern="0" dirty="0" err="1">
@@ -11079,7 +10656,7 @@
         </p:nvSpPr>
         <p:spPr bwMode="auto">
           <a:xfrm>
-            <a:off x="2625142" y="896980"/>
+            <a:off x="2187517" y="896980"/>
             <a:ext cx="780758" cy="396000"/>
           </a:xfrm>
           <a:prstGeom prst="rect">
@@ -11130,7 +10707,7 @@
         </p:nvCxnSpPr>
         <p:spPr>
           <a:xfrm>
-            <a:off x="3856213" y="710626"/>
+            <a:off x="3687450" y="710626"/>
             <a:ext cx="0" cy="186126"/>
           </a:xfrm>
           <a:prstGeom prst="line">
@@ -11171,7 +10748,7 @@
         </p:nvGrpSpPr>
         <p:grpSpPr>
           <a:xfrm>
-            <a:off x="3742328" y="706906"/>
+            <a:off x="3742328" y="703174"/>
             <a:ext cx="151694" cy="171451"/>
             <a:chOff x="4873292" y="193240"/>
             <a:chExt cx="151694" cy="171451"/>
@@ -11326,8 +10903,8 @@
         </p:nvCxnSpPr>
         <p:spPr>
           <a:xfrm rot="5400000">
-            <a:off x="2197127" y="940990"/>
-            <a:ext cx="466404" cy="1170384"/>
+            <a:off x="1978315" y="1159803"/>
+            <a:ext cx="466404" cy="732759"/>
           </a:xfrm>
           <a:prstGeom prst="bentConnector2">
             <a:avLst/>
@@ -11367,7 +10944,7 @@
         </p:nvGrpSpPr>
         <p:grpSpPr>
           <a:xfrm>
-            <a:off x="2898472" y="1303134"/>
+            <a:off x="2462244" y="1283862"/>
             <a:ext cx="151694" cy="171451"/>
             <a:chOff x="4873292" y="193240"/>
             <a:chExt cx="151694" cy="171451"/>
@@ -11516,13 +11093,12 @@
           </p:cNvPr>
           <p:cNvCxnSpPr>
             <a:cxnSpLocks/>
-            <a:endCxn id="220" idx="1"/>
           </p:cNvCxnSpPr>
           <p:nvPr/>
         </p:nvCxnSpPr>
         <p:spPr>
           <a:xfrm rot="16200000" flipH="1">
-            <a:off x="2208128" y="3971044"/>
+            <a:off x="1939680" y="3971044"/>
             <a:ext cx="5166269" cy="184550"/>
           </a:xfrm>
           <a:prstGeom prst="bentConnector2">
@@ -12556,7 +12132,7 @@
         </p:nvGrpSpPr>
         <p:grpSpPr>
           <a:xfrm>
-            <a:off x="10571976" y="1324382"/>
+            <a:off x="10571976" y="1283862"/>
             <a:ext cx="151694" cy="171451"/>
             <a:chOff x="4873292" y="193240"/>
             <a:chExt cx="151694" cy="171451"/>
@@ -12633,7 +12209,7 @@
                 <a:buNone/>
               </a:pPr>
               <a:r>
-                <a:rPr lang="en-US" sz="800" b="1"/>
+                <a:rPr lang="en-US" sz="800" b="1" dirty="0"/>
                 <a:t>R</a:t>
               </a:r>
             </a:p>
@@ -12779,7 +12355,7 @@
         </p:nvCxnSpPr>
         <p:spPr>
           <a:xfrm>
-            <a:off x="4686437" y="1541722"/>
+            <a:off x="4417989" y="1541722"/>
             <a:ext cx="0" cy="33960"/>
           </a:xfrm>
           <a:prstGeom prst="line">
@@ -12822,7 +12398,7 @@
         </p:nvCxnSpPr>
         <p:spPr>
           <a:xfrm>
-            <a:off x="4711574" y="1545401"/>
+            <a:off x="4443126" y="1545401"/>
             <a:ext cx="0" cy="33960"/>
           </a:xfrm>
           <a:prstGeom prst="line">
@@ -12865,7 +12441,7 @@
         </p:nvCxnSpPr>
         <p:spPr>
           <a:xfrm>
-            <a:off x="4686437" y="1639265"/>
+            <a:off x="4417989" y="1639265"/>
             <a:ext cx="0" cy="33960"/>
           </a:xfrm>
           <a:prstGeom prst="line">
@@ -12908,7 +12484,7 @@
         </p:nvCxnSpPr>
         <p:spPr>
           <a:xfrm>
-            <a:off x="4711700" y="1636090"/>
+            <a:off x="4443252" y="1636090"/>
             <a:ext cx="0" cy="33960"/>
           </a:xfrm>
           <a:prstGeom prst="line">
@@ -12953,7 +12529,7 @@
         </p:nvCxnSpPr>
         <p:spPr>
           <a:xfrm flipV="1">
-            <a:off x="3221695" y="1300062"/>
+            <a:off x="2819105" y="1300062"/>
             <a:ext cx="0" cy="180122"/>
           </a:xfrm>
           <a:prstGeom prst="line">
@@ -13037,7 +12613,7 @@
         </p:nvSpPr>
         <p:spPr>
           <a:xfrm>
-            <a:off x="5374025" y="4039169"/>
+            <a:off x="5105577" y="4039169"/>
             <a:ext cx="1548000" cy="1699200"/>
           </a:xfrm>
           <a:prstGeom prst="rect">
@@ -13134,7 +12710,7 @@
         </p:nvGrpSpPr>
         <p:grpSpPr>
           <a:xfrm>
-            <a:off x="5414400" y="4993920"/>
+            <a:off x="5145952" y="4993920"/>
             <a:ext cx="1468800" cy="162000"/>
             <a:chOff x="5414400" y="5018400"/>
             <a:chExt cx="1468800" cy="162000"/>
@@ -13251,7 +12827,7 @@
         </p:nvGrpSpPr>
         <p:grpSpPr>
           <a:xfrm>
-            <a:off x="5414400" y="5211360"/>
+            <a:off x="5145952" y="5211360"/>
             <a:ext cx="1465200" cy="162000"/>
             <a:chOff x="5414400" y="5220000"/>
             <a:chExt cx="1465200" cy="162000"/>
@@ -13368,7 +12944,7 @@
         </p:nvGrpSpPr>
         <p:grpSpPr>
           <a:xfrm>
-            <a:off x="5414271" y="4085581"/>
+            <a:off x="5145823" y="4085581"/>
             <a:ext cx="1468929" cy="162000"/>
             <a:chOff x="5414271" y="4085581"/>
             <a:chExt cx="1468929" cy="162000"/>
@@ -13535,7 +13111,7 @@
         </p:nvGrpSpPr>
         <p:grpSpPr bwMode="auto">
           <a:xfrm rot="5400000">
-            <a:off x="6893262" y="4348395"/>
+            <a:off x="6624814" y="4348395"/>
             <a:ext cx="166994" cy="162315"/>
             <a:chOff x="998" y="3624"/>
             <a:chExt cx="271" cy="271"/>
@@ -13722,7 +13298,7 @@
         </p:nvSpPr>
         <p:spPr bwMode="auto">
           <a:xfrm>
-            <a:off x="7056000" y="4341600"/>
+            <a:off x="6787552" y="4341600"/>
             <a:ext cx="709200" cy="162000"/>
           </a:xfrm>
           <a:prstGeom prst="roundRect">
@@ -13772,7 +13348,7 @@
         </p:nvCxnSpPr>
         <p:spPr>
           <a:xfrm flipH="1">
-            <a:off x="7506000" y="4341600"/>
+            <a:off x="7237552" y="4341600"/>
             <a:ext cx="0" cy="162000"/>
           </a:xfrm>
           <a:prstGeom prst="line">
@@ -13805,7 +13381,7 @@
         </p:nvGrpSpPr>
         <p:grpSpPr>
           <a:xfrm>
-            <a:off x="5414400" y="4559040"/>
+            <a:off x="5145952" y="4559040"/>
             <a:ext cx="1468800" cy="162000"/>
             <a:chOff x="5414400" y="4561200"/>
             <a:chExt cx="1468800" cy="162000"/>
@@ -13922,7 +13498,7 @@
         </p:nvGrpSpPr>
         <p:grpSpPr>
           <a:xfrm>
-            <a:off x="5414400" y="5428800"/>
+            <a:off x="5145952" y="5428800"/>
             <a:ext cx="1468800" cy="162000"/>
             <a:chOff x="5414400" y="5428800"/>
             <a:chExt cx="1468800" cy="162000"/>
@@ -14051,7 +13627,7 @@
         </p:nvSpPr>
         <p:spPr bwMode="gray">
           <a:xfrm>
-            <a:off x="5500800" y="5605200"/>
+            <a:off x="5232352" y="5605200"/>
             <a:ext cx="1242872" cy="141142"/>
           </a:xfrm>
           <a:prstGeom prst="wedgeRectCallout">
@@ -14124,7 +13700,7 @@
         </p:nvCxnSpPr>
         <p:spPr>
           <a:xfrm rot="5400000">
-            <a:off x="6295720" y="3013586"/>
+            <a:off x="6027272" y="3013586"/>
             <a:ext cx="2191119" cy="1008956"/>
           </a:xfrm>
           <a:prstGeom prst="bentConnector3">
@@ -14164,7 +13740,7 @@
         </p:nvCxnSpPr>
         <p:spPr>
           <a:xfrm rot="5400000">
-            <a:off x="6200936" y="3097303"/>
+            <a:off x="5932488" y="3097303"/>
             <a:ext cx="2442442" cy="1077913"/>
           </a:xfrm>
           <a:prstGeom prst="bentConnector2">
@@ -14205,7 +13781,7 @@
         </p:nvGrpSpPr>
         <p:grpSpPr>
           <a:xfrm>
-            <a:off x="7256093" y="4823572"/>
+            <a:off x="6987645" y="4823572"/>
             <a:ext cx="133802" cy="181810"/>
             <a:chOff x="5750967" y="257947"/>
             <a:chExt cx="133802" cy="181810"/>
@@ -14360,7 +13936,7 @@
         </p:nvCxnSpPr>
         <p:spPr>
           <a:xfrm rot="16200000" flipH="1">
-            <a:off x="6005966" y="4687134"/>
+            <a:off x="5737518" y="4687134"/>
             <a:ext cx="2268193" cy="1389086"/>
           </a:xfrm>
           <a:prstGeom prst="bentConnector3">
@@ -14399,8 +13975,8 @@
         </p:nvSpPr>
         <p:spPr bwMode="auto">
           <a:xfrm>
-            <a:off x="4883537" y="6519326"/>
-            <a:ext cx="6441412" cy="254256"/>
+            <a:off x="4610013" y="6519326"/>
+            <a:ext cx="6714936" cy="254256"/>
           </a:xfrm>
           <a:prstGeom prst="rect">
             <a:avLst/>
@@ -14436,7 +14012,7 @@
         </p:nvGrpSpPr>
         <p:grpSpPr>
           <a:xfrm>
-            <a:off x="7771859" y="2427490"/>
+            <a:off x="7503411" y="2419101"/>
             <a:ext cx="151694" cy="171451"/>
             <a:chOff x="4873292" y="193240"/>
             <a:chExt cx="151694" cy="171451"/>
@@ -14574,13 +14150,13 @@
         </p:nvCxnSpPr>
         <p:spPr>
           <a:xfrm>
-            <a:off x="6883200" y="5509800"/>
-            <a:ext cx="3100935" cy="734627"/>
+            <a:off x="6614752" y="5509800"/>
+            <a:ext cx="3369383" cy="734627"/>
           </a:xfrm>
           <a:prstGeom prst="bentConnector4">
             <a:avLst>
-              <a:gd name="adj1" fmla="val 27359"/>
-              <a:gd name="adj2" fmla="val 156871"/>
+              <a:gd name="adj1" fmla="val 24183"/>
+              <a:gd name="adj2" fmla="val 156241"/>
             </a:avLst>
           </a:prstGeom>
           <a:ln w="12700">
@@ -14618,7 +14194,7 @@
         </p:nvGrpSpPr>
         <p:grpSpPr>
           <a:xfrm>
-            <a:off x="7256093" y="5472425"/>
+            <a:off x="6987645" y="5472425"/>
             <a:ext cx="133802" cy="181810"/>
             <a:chOff x="5750967" y="257947"/>
             <a:chExt cx="133802" cy="181810"/>
@@ -14967,7 +14543,7 @@
         </p:nvCxnSpPr>
         <p:spPr>
           <a:xfrm rot="5400000">
-            <a:off x="6709957" y="3249297"/>
+            <a:off x="6441509" y="3249297"/>
             <a:ext cx="495955" cy="268732"/>
           </a:xfrm>
           <a:prstGeom prst="bentConnector3">
@@ -15012,7 +14588,7 @@
         </p:nvCxnSpPr>
         <p:spPr>
           <a:xfrm rot="10800000">
-            <a:off x="5990925" y="3010255"/>
+            <a:off x="5722477" y="3010255"/>
             <a:ext cx="1101677" cy="125432"/>
           </a:xfrm>
           <a:prstGeom prst="bentConnector3">
@@ -15055,7 +14631,7 @@
         </p:nvGrpSpPr>
         <p:grpSpPr>
           <a:xfrm>
-            <a:off x="6984234" y="3262206"/>
+            <a:off x="6715786" y="3262206"/>
             <a:ext cx="151694" cy="171029"/>
             <a:chOff x="4873292" y="581648"/>
             <a:chExt cx="151694" cy="171029"/>
@@ -15210,7 +14786,7 @@
         </p:nvCxnSpPr>
         <p:spPr>
           <a:xfrm rot="5400000">
-            <a:off x="6771080" y="3064595"/>
+            <a:off x="6502632" y="3064595"/>
             <a:ext cx="1345390" cy="274439"/>
           </a:xfrm>
           <a:prstGeom prst="bentConnector2">
@@ -15248,17 +14824,18 @@
           </p:cNvPr>
           <p:cNvCxnSpPr>
             <a:cxnSpLocks/>
+            <a:stCxn id="601" idx="4"/>
           </p:cNvCxnSpPr>
           <p:nvPr/>
         </p:nvCxnSpPr>
         <p:spPr>
           <a:xfrm rot="10800000" flipV="1">
-            <a:off x="2387644" y="1824515"/>
-            <a:ext cx="3988128" cy="376036"/>
+            <a:off x="2387649" y="1820003"/>
+            <a:ext cx="2281385" cy="380546"/>
           </a:xfrm>
           <a:prstGeom prst="bentConnector3">
             <a:avLst>
-              <a:gd name="adj1" fmla="val 100155"/>
+              <a:gd name="adj1" fmla="val 99823"/>
             </a:avLst>
           </a:prstGeom>
           <a:ln w="12700">
@@ -15293,17 +14870,18 @@
           </p:cNvPr>
           <p:cNvCxnSpPr>
             <a:cxnSpLocks/>
+            <a:stCxn id="601" idx="0"/>
           </p:cNvCxnSpPr>
           <p:nvPr/>
         </p:nvCxnSpPr>
         <p:spPr>
           <a:xfrm>
-            <a:off x="6375600" y="1825200"/>
-            <a:ext cx="1208057" cy="702985"/>
+            <a:off x="4741033" y="1820003"/>
+            <a:ext cx="2574176" cy="708182"/>
           </a:xfrm>
           <a:prstGeom prst="bentConnector3">
             <a:avLst>
-              <a:gd name="adj1" fmla="val 1904"/>
+              <a:gd name="adj1" fmla="val 53911"/>
             </a:avLst>
           </a:prstGeom>
           <a:ln w="12700">
@@ -15341,7 +14919,7 @@
         </p:nvGrpSpPr>
         <p:grpSpPr>
           <a:xfrm>
-            <a:off x="4896816" y="1666192"/>
+            <a:off x="4628368" y="1666192"/>
             <a:ext cx="161055" cy="189811"/>
             <a:chOff x="6020928" y="505632"/>
             <a:chExt cx="161055" cy="189811"/>
@@ -15493,7 +15071,7 @@
         </p:nvGrpSpPr>
         <p:grpSpPr>
           <a:xfrm>
-            <a:off x="7796084" y="6030736"/>
+            <a:off x="7527636" y="6030736"/>
             <a:ext cx="180269" cy="171451"/>
             <a:chOff x="5145186" y="193240"/>
             <a:chExt cx="180269" cy="171451"/>
@@ -15645,7 +15223,7 @@
         </p:nvGrpSpPr>
         <p:grpSpPr>
           <a:xfrm>
-            <a:off x="3108274" y="1303134"/>
+            <a:off x="2705684" y="1283862"/>
             <a:ext cx="151694" cy="171451"/>
             <a:chOff x="4873292" y="193240"/>
             <a:chExt cx="151694" cy="171451"/>
@@ -15797,7 +15375,7 @@
         </p:nvCxnSpPr>
         <p:spPr>
           <a:xfrm>
-            <a:off x="7165975" y="1474995"/>
+            <a:off x="6897527" y="1474995"/>
             <a:ext cx="0" cy="737766"/>
           </a:xfrm>
           <a:prstGeom prst="line">
@@ -15833,13 +15411,15 @@
               </a:ext>
             </a:extLst>
           </p:cNvPr>
-          <p:cNvCxnSpPr/>
+          <p:cNvCxnSpPr>
+            <a:cxnSpLocks/>
+          </p:cNvCxnSpPr>
           <p:nvPr/>
         </p:nvCxnSpPr>
         <p:spPr>
           <a:xfrm>
-            <a:off x="3215345" y="1480183"/>
-            <a:ext cx="3953805" cy="0"/>
+            <a:off x="2812755" y="1480183"/>
+            <a:ext cx="4092183" cy="0"/>
           </a:xfrm>
           <a:prstGeom prst="line">
             <a:avLst/>
@@ -15879,7 +15459,7 @@
         </p:nvSpPr>
         <p:spPr bwMode="gray">
           <a:xfrm rot="5400000">
-            <a:off x="4781304" y="3728317"/>
+            <a:off x="4512856" y="3728317"/>
             <a:ext cx="2732233" cy="2190512"/>
           </a:xfrm>
           <a:prstGeom prst="corner">
@@ -15930,7 +15510,7 @@
         </p:nvSpPr>
         <p:spPr bwMode="auto">
           <a:xfrm>
-            <a:off x="5414271" y="3774716"/>
+            <a:off x="5145823" y="3774716"/>
             <a:ext cx="1672684" cy="199586"/>
           </a:xfrm>
           <a:prstGeom prst="rect">
@@ -15985,7 +15565,7 @@
         </p:nvSpPr>
         <p:spPr bwMode="auto">
           <a:xfrm>
-            <a:off x="7091873" y="3774716"/>
+            <a:off x="6823425" y="3774716"/>
             <a:ext cx="214682" cy="199586"/>
           </a:xfrm>
           <a:prstGeom prst="rect">
@@ -16039,7 +15619,7 @@
         </p:nvSpPr>
         <p:spPr bwMode="auto">
           <a:xfrm>
-            <a:off x="6934916" y="5890287"/>
+            <a:off x="6666468" y="5890287"/>
             <a:ext cx="424463" cy="371513"/>
           </a:xfrm>
           <a:prstGeom prst="rect">
@@ -16091,7 +15671,7 @@
         </p:nvSpPr>
         <p:spPr>
           <a:xfrm>
-            <a:off x="5088318" y="3502636"/>
+            <a:off x="4819870" y="3502636"/>
             <a:ext cx="1878383" cy="153888"/>
           </a:xfrm>
           <a:prstGeom prst="rect">
@@ -16248,7 +15828,7 @@
         </p:nvGrpSpPr>
         <p:grpSpPr bwMode="auto">
           <a:xfrm rot="5400000">
-            <a:off x="6890703" y="4101672"/>
+            <a:off x="6622255" y="4101672"/>
             <a:ext cx="158400" cy="162000"/>
             <a:chOff x="998" y="3624"/>
             <a:chExt cx="271" cy="271"/>
@@ -16435,7 +16015,7 @@
         </p:nvSpPr>
         <p:spPr bwMode="auto">
           <a:xfrm>
-            <a:off x="6460815" y="2208506"/>
+            <a:off x="6192367" y="2208506"/>
             <a:ext cx="1596283" cy="206532"/>
           </a:xfrm>
           <a:prstGeom prst="rect">
@@ -16634,7 +16214,7 @@
         </p:nvGrpSpPr>
         <p:grpSpPr>
           <a:xfrm>
-            <a:off x="5418000" y="4776480"/>
+            <a:off x="5149552" y="4776480"/>
             <a:ext cx="1465200" cy="162000"/>
             <a:chOff x="5418000" y="4816800"/>
             <a:chExt cx="1465200" cy="162000"/>
@@ -16965,7 +16545,7 @@
         </p:nvSpPr>
         <p:spPr bwMode="auto">
           <a:xfrm>
-            <a:off x="5414400" y="4341600"/>
+            <a:off x="5145952" y="4341600"/>
             <a:ext cx="1260000" cy="162000"/>
           </a:xfrm>
           <a:prstGeom prst="rect">
@@ -17019,7 +16599,7 @@
         </p:nvSpPr>
         <p:spPr bwMode="auto">
           <a:xfrm>
-            <a:off x="6667200" y="4341600"/>
+            <a:off x="6398752" y="4341600"/>
             <a:ext cx="216000" cy="162000"/>
           </a:xfrm>
           <a:prstGeom prst="rect">
@@ -17071,7 +16651,7 @@
         </p:nvGrpSpPr>
         <p:grpSpPr>
           <a:xfrm>
-            <a:off x="5414400" y="5785200"/>
+            <a:off x="5145952" y="5785200"/>
             <a:ext cx="1468800" cy="162000"/>
             <a:chOff x="5414400" y="5785200"/>
             <a:chExt cx="1468800" cy="162000"/>
@@ -17194,7 +16774,7 @@
         </p:nvGrpSpPr>
         <p:grpSpPr>
           <a:xfrm>
-            <a:off x="5414400" y="5994000"/>
+            <a:off x="5145952" y="5994000"/>
             <a:ext cx="1468800" cy="162000"/>
             <a:chOff x="5414400" y="5994000"/>
             <a:chExt cx="1468800" cy="162000"/>
@@ -17319,7 +16899,7 @@
         </p:nvCxnSpPr>
         <p:spPr>
           <a:xfrm flipH="1" flipV="1">
-            <a:off x="6883200" y="4668615"/>
+            <a:off x="6614752" y="4668615"/>
             <a:ext cx="3600" cy="153392"/>
           </a:xfrm>
           <a:prstGeom prst="bentConnector3">
@@ -17364,7 +16944,7 @@
         </p:nvCxnSpPr>
         <p:spPr>
           <a:xfrm>
-            <a:off x="6883200" y="4902915"/>
+            <a:off x="6614752" y="4902915"/>
             <a:ext cx="573" cy="931501"/>
           </a:xfrm>
           <a:prstGeom prst="bentConnector3">
@@ -17407,7 +16987,7 @@
         </p:nvGrpSpPr>
         <p:grpSpPr>
           <a:xfrm>
-            <a:off x="7078842" y="4642142"/>
+            <a:off x="6810394" y="4642142"/>
             <a:ext cx="180269" cy="171451"/>
             <a:chOff x="5145186" y="193240"/>
             <a:chExt cx="180269" cy="171451"/>
@@ -17559,7 +17139,7 @@
         </p:nvGrpSpPr>
         <p:grpSpPr>
           <a:xfrm>
-            <a:off x="7077128" y="5669421"/>
+            <a:off x="6808680" y="5669421"/>
             <a:ext cx="180269" cy="171029"/>
             <a:chOff x="5145186" y="581648"/>
             <a:chExt cx="180269" cy="171029"/>
@@ -18341,7 +17921,7 @@
         </p:nvSpPr>
         <p:spPr>
           <a:xfrm>
-            <a:off x="1748688" y="30582"/>
+            <a:off x="1757077" y="-11363"/>
             <a:ext cx="1585819" cy="369332"/>
           </a:xfrm>
           <a:prstGeom prst="rect">
@@ -18356,7 +17936,7 @@
           <a:lstStyle/>
           <a:p>
             <a:r>
-              <a:rPr lang="en-US"/>
+              <a:rPr lang="en-US" dirty="0"/>
               <a:t>Garden Cluster</a:t>
             </a:r>
           </a:p>
@@ -18376,8 +17956,8 @@
         </p:nvSpPr>
         <p:spPr>
           <a:xfrm>
-            <a:off x="5828867" y="58462"/>
-            <a:ext cx="1351588" cy="369332"/>
+            <a:off x="5443663" y="16517"/>
+            <a:ext cx="1582228" cy="369332"/>
           </a:xfrm>
           <a:prstGeom prst="rect">
             <a:avLst/>
@@ -18391,8 +17971,8 @@
           <a:lstStyle/>
           <a:p>
             <a:r>
-              <a:rPr lang="en-US"/>
-              <a:t>Seed Cluster</a:t>
+              <a:rPr lang="en-US" dirty="0"/>
+              <a:t>Seed Cluster(s)</a:t>
             </a:r>
           </a:p>
         </p:txBody>
@@ -18411,8 +17991,8 @@
         </p:nvSpPr>
         <p:spPr>
           <a:xfrm>
-            <a:off x="9235715" y="50224"/>
-            <a:ext cx="1441357" cy="369332"/>
+            <a:off x="9126658" y="8279"/>
+            <a:ext cx="1671996" cy="369332"/>
           </a:xfrm>
           <a:prstGeom prst="rect">
             <a:avLst/>
@@ -18426,8 +18006,172 @@
           <a:lstStyle/>
           <a:p>
             <a:r>
-              <a:rPr lang="en-US"/>
-              <a:t>Shoot Cluster</a:t>
+              <a:rPr lang="en-US" dirty="0"/>
+              <a:t>Shoot Cluster(s)</a:t>
+            </a:r>
+          </a:p>
+        </p:txBody>
+      </p:sp>
+      <p:cxnSp>
+        <p:nvCxnSpPr>
+          <p:cNvPr id="2" name="Straight Connector 1">
+            <a:extLst>
+              <a:ext uri="{FF2B5EF4-FFF2-40B4-BE49-F238E27FC236}">
+                <a16:creationId xmlns:a16="http://schemas.microsoft.com/office/drawing/2014/main" id="{85F2A561-6E2B-8B8A-3949-09CD315DF29D}"/>
+              </a:ext>
+            </a:extLst>
+          </p:cNvPr>
+          <p:cNvCxnSpPr>
+            <a:cxnSpLocks/>
+          </p:cNvCxnSpPr>
+          <p:nvPr/>
+        </p:nvCxnSpPr>
+        <p:spPr>
+          <a:xfrm>
+            <a:off x="8045203" y="50224"/>
+            <a:ext cx="0" cy="6723358"/>
+          </a:xfrm>
+          <a:prstGeom prst="line">
+            <a:avLst/>
+          </a:prstGeom>
+          <a:ln w="12700">
+            <a:solidFill>
+              <a:schemeClr val="tx1"/>
+            </a:solidFill>
+            <a:prstDash val="dash"/>
+          </a:ln>
+        </p:spPr>
+        <p:style>
+          <a:lnRef idx="1">
+            <a:schemeClr val="accent1"/>
+          </a:lnRef>
+          <a:fillRef idx="0">
+            <a:schemeClr val="accent1"/>
+          </a:fillRef>
+          <a:effectRef idx="0">
+            <a:schemeClr val="accent1"/>
+          </a:effectRef>
+          <a:fontRef idx="minor">
+            <a:schemeClr val="tx1"/>
+          </a:fontRef>
+        </p:style>
+      </p:cxnSp>
+      <p:cxnSp>
+        <p:nvCxnSpPr>
+          <p:cNvPr id="37" name="Straight Connector 36">
+            <a:extLst>
+              <a:ext uri="{FF2B5EF4-FFF2-40B4-BE49-F238E27FC236}">
+                <a16:creationId xmlns:a16="http://schemas.microsoft.com/office/drawing/2014/main" id="{71CA981B-1655-2BF8-9B57-49F87444AA4E}"/>
+              </a:ext>
+            </a:extLst>
+          </p:cNvPr>
+          <p:cNvCxnSpPr>
+            <a:cxnSpLocks/>
+          </p:cNvCxnSpPr>
+          <p:nvPr/>
+        </p:nvCxnSpPr>
+        <p:spPr>
+          <a:xfrm>
+            <a:off x="4244990" y="50224"/>
+            <a:ext cx="0" cy="6723358"/>
+          </a:xfrm>
+          <a:prstGeom prst="line">
+            <a:avLst/>
+          </a:prstGeom>
+          <a:ln w="12700">
+            <a:solidFill>
+              <a:schemeClr val="tx1"/>
+            </a:solidFill>
+            <a:prstDash val="dash"/>
+          </a:ln>
+        </p:spPr>
+        <p:style>
+          <a:lnRef idx="1">
+            <a:schemeClr val="accent1"/>
+          </a:lnRef>
+          <a:fillRef idx="0">
+            <a:schemeClr val="accent1"/>
+          </a:fillRef>
+          <a:effectRef idx="0">
+            <a:schemeClr val="accent1"/>
+          </a:effectRef>
+          <a:fontRef idx="minor">
+            <a:schemeClr val="tx1"/>
+          </a:fontRef>
+        </p:style>
+      </p:cxnSp>
+      <p:sp>
+        <p:nvSpPr>
+          <p:cNvPr id="49" name="TextBox 48">
+            <a:extLst>
+              <a:ext uri="{FF2B5EF4-FFF2-40B4-BE49-F238E27FC236}">
+                <a16:creationId xmlns:a16="http://schemas.microsoft.com/office/drawing/2014/main" id="{719F6967-FF53-1972-57BF-E9BA2984BF34}"/>
+              </a:ext>
+            </a:extLst>
+          </p:cNvPr>
+          <p:cNvSpPr txBox="1"/>
+          <p:nvPr/>
+        </p:nvSpPr>
+        <p:spPr>
+          <a:xfrm>
+            <a:off x="9989395" y="1401588"/>
+            <a:ext cx="1394934" cy="276999"/>
+          </a:xfrm>
+          <a:prstGeom prst="rect">
+            <a:avLst/>
+          </a:prstGeom>
+          <a:noFill/>
+        </p:spPr>
+        <p:txBody>
+          <a:bodyPr wrap="none" rtlCol="0">
+            <a:spAutoFit/>
+          </a:bodyPr>
+          <a:lstStyle/>
+          <a:p>
+            <a:r>
+              <a:rPr lang="en-DE" sz="600" dirty="0"/>
+              <a:t>not recommended</a:t>
+            </a:r>
+          </a:p>
+          <a:p>
+            <a:r>
+              <a:rPr lang="en-DE" sz="600" dirty="0"/>
+              <a:t>disabled for all non  evaluation clusters</a:t>
+            </a:r>
+          </a:p>
+        </p:txBody>
+      </p:sp>
+      <p:sp>
+        <p:nvSpPr>
+          <p:cNvPr id="50" name="TextBox 49">
+            <a:extLst>
+              <a:ext uri="{FF2B5EF4-FFF2-40B4-BE49-F238E27FC236}">
+                <a16:creationId xmlns:a16="http://schemas.microsoft.com/office/drawing/2014/main" id="{BCCCCFD3-ADE5-8755-6563-56D3291C04BD}"/>
+              </a:ext>
+            </a:extLst>
+          </p:cNvPr>
+          <p:cNvSpPr txBox="1"/>
+          <p:nvPr/>
+        </p:nvSpPr>
+        <p:spPr>
+          <a:xfrm>
+            <a:off x="6868936" y="2383032"/>
+            <a:ext cx="710451" cy="184666"/>
+          </a:xfrm>
+          <a:prstGeom prst="rect">
+            <a:avLst/>
+          </a:prstGeom>
+          <a:noFill/>
+        </p:spPr>
+        <p:txBody>
+          <a:bodyPr wrap="none" rtlCol="0">
+            <a:spAutoFit/>
+          </a:bodyPr>
+          <a:lstStyle/>
+          <a:p>
+            <a:r>
+              <a:rPr lang="en-DE" sz="600" dirty="0"/>
+              <a:t>SNI Routing Only</a:t>
             </a:r>
           </a:p>
         </p:txBody>

</xml_diff>